<commit_message>
fixed glitch, modified presentation
</commit_message>
<xml_diff>
--- a/Revision0Presentaiton.pptx
+++ b/Revision0Presentaiton.pptx
@@ -3301,13 +3301,10 @@
               <a:buNone/>
             </a:pPr>
             <a:r>
-              <a:rPr lang="en-US" dirty="0"/>
-              <a:t>	</a:t>
-            </a:r>
-            <a:r>
               <a:rPr lang="en-US" dirty="0" smtClean="0"/>
-              <a:t>Neutral/Disagree</a:t>
-            </a:r>
+              <a:t>Disagree</a:t>
+            </a:r>
+            <a:endParaRPr lang="en-US" dirty="0" smtClean="0"/>
           </a:p>
           <a:p>
             <a:pPr marL="777240" lvl="2" indent="0">
@@ -3330,12 +3327,13 @@
             </a:pPr>
             <a:r>
               <a:rPr lang="en-US" dirty="0"/>
-              <a:t>	</a:t>
+              <a:t> </a:t>
             </a:r>
             <a:r>
               <a:rPr lang="en-US" dirty="0" smtClean="0"/>
-              <a:t>Agree</a:t>
-            </a:r>
+              <a:t>      Agree</a:t>
+            </a:r>
+            <a:endParaRPr lang="en-US" dirty="0" smtClean="0"/>
           </a:p>
           <a:p>
             <a:pPr marL="411480" lvl="1" indent="0">
@@ -3349,35 +3347,6 @@
             </a:pPr>
             <a:r>
               <a:rPr lang="en-US" dirty="0"/>
-              <a:t>The organization of information on the screen was </a:t>
-            </a:r>
-            <a:r>
-              <a:rPr lang="en-US" dirty="0" smtClean="0"/>
-              <a:t>clear</a:t>
-            </a:r>
-          </a:p>
-          <a:p>
-            <a:pPr marL="411480" lvl="1" indent="0">
-              <a:buNone/>
-            </a:pPr>
-            <a:r>
-              <a:rPr lang="en-US" dirty="0" smtClean="0"/>
-              <a:t>	Neutral/Disagree</a:t>
-            </a:r>
-            <a:endParaRPr lang="en-US" dirty="0"/>
-          </a:p>
-          <a:p>
-            <a:pPr marL="868680" lvl="1" indent="-457200">
-              <a:buAutoNum type="arabicParenR"/>
-            </a:pPr>
-            <a:endParaRPr lang="en-US" dirty="0"/>
-          </a:p>
-          <a:p>
-            <a:pPr marL="571500" indent="-457200">
-              <a:buAutoNum type="arabicParenR"/>
-            </a:pPr>
-            <a:r>
-              <a:rPr lang="en-US" dirty="0"/>
               <a:t>Overall I was happy with the </a:t>
             </a:r>
             <a:r>
@@ -3391,14 +3360,8 @@
             </a:pPr>
             <a:r>
               <a:rPr lang="en-US" dirty="0" smtClean="0"/>
-              <a:t>Agree/Neutral</a:t>
-            </a:r>
-          </a:p>
-          <a:p>
-            <a:pPr marL="571500" indent="-457200">
-              <a:buAutoNum type="arabicParenR"/>
-            </a:pPr>
-            <a:endParaRPr lang="en-US" dirty="0"/>
+              <a:t>Agree</a:t>
+            </a:r>
           </a:p>
           <a:p>
             <a:endParaRPr lang="en-US" dirty="0"/>
@@ -4290,8 +4253,9 @@
             </a:pPr>
             <a:r>
               <a:rPr lang="en-US" dirty="0" smtClean="0"/>
-              <a:t>	Easy/Moderate</a:t>
-            </a:r>
+              <a:t>Neutral/Agree</a:t>
+            </a:r>
+            <a:endParaRPr lang="en-US" dirty="0" smtClean="0"/>
           </a:p>
           <a:p>
             <a:pPr marL="777240" lvl="2" indent="0">
@@ -4314,8 +4278,9 @@
             </a:pPr>
             <a:r>
               <a:rPr lang="en-US" dirty="0" smtClean="0"/>
-              <a:t>	Agree</a:t>
-            </a:r>
+              <a:t>Agree</a:t>
+            </a:r>
+            <a:endParaRPr lang="en-US" dirty="0" smtClean="0"/>
           </a:p>
           <a:p>
             <a:pPr marL="777240" lvl="2" indent="0">
@@ -4335,7 +4300,11 @@
             </a:pPr>
             <a:r>
               <a:rPr lang="en-US" dirty="0" smtClean="0"/>
-              <a:t>I prefer using Smart-Waiter over traditional sense</a:t>
+              <a:t>I prefer using Smart-Waiter over traditional </a:t>
+            </a:r>
+            <a:r>
+              <a:rPr lang="en-US" dirty="0" smtClean="0"/>
+              <a:t>sense</a:t>
             </a:r>
           </a:p>
           <a:p>
@@ -4344,7 +4313,7 @@
             </a:pPr>
             <a:r>
               <a:rPr lang="en-US" dirty="0" smtClean="0"/>
-              <a:t>	No Preference/Agree</a:t>
+              <a:t>Agree</a:t>
             </a:r>
           </a:p>
           <a:p>
@@ -4365,7 +4334,11 @@
             </a:pPr>
             <a:r>
               <a:rPr lang="en-US" dirty="0" smtClean="0"/>
-              <a:t>The interface of the system was pleasant</a:t>
+              <a:t>The interface of the system was </a:t>
+            </a:r>
+            <a:r>
+              <a:rPr lang="en-US" dirty="0" smtClean="0"/>
+              <a:t>pleasant</a:t>
             </a:r>
           </a:p>
           <a:p>
@@ -4374,8 +4347,9 @@
             </a:pPr>
             <a:r>
               <a:rPr lang="en-US" dirty="0" smtClean="0"/>
-              <a:t>	Disagree</a:t>
-            </a:r>
+              <a:t>Disagree</a:t>
+            </a:r>
+            <a:endParaRPr lang="en-US" dirty="0" smtClean="0"/>
           </a:p>
         </p:txBody>
       </p:sp>

</xml_diff>